<commit_message>
more references and more work
</commit_message>
<xml_diff>
--- a/BradleyMcDonaldExamPresentation.pptx
+++ b/BradleyMcDonaldExamPresentation.pptx
@@ -13,9 +13,10 @@
     <p:sldId id="265" r:id="rId7"/>
     <p:sldId id="268" r:id="rId8"/>
     <p:sldId id="267" r:id="rId9"/>
-    <p:sldId id="266" r:id="rId10"/>
-    <p:sldId id="261" r:id="rId11"/>
-    <p:sldId id="264" r:id="rId12"/>
+    <p:sldId id="269" r:id="rId10"/>
+    <p:sldId id="266" r:id="rId11"/>
+    <p:sldId id="261" r:id="rId12"/>
+    <p:sldId id="264" r:id="rId13"/>
   </p:sldIdLst>
   <p:sldSz cx="12192000" cy="6858000"/>
   <p:notesSz cx="6858000" cy="9144000"/>
@@ -172,7 +173,7 @@
           <a:noFill/>
           <a:extLst>
             <a:ext uri="{909E8E84-426E-40dd-AFC4-6F175D3DCCD1}">
-              <a14:hiddenFill xmlns="" xmlns:a14="http://schemas.microsoft.com/office/drawing/2010/main">
+              <a14:hiddenFill xmlns:a14="http://schemas.microsoft.com/office/drawing/2010/main" xmlns="">
                 <a:solidFill>
                   <a:srgbClr val="FFFFFF"/>
                 </a:solidFill>
@@ -232,7 +233,7 @@
             </a:ln>
             <a:extLst>
               <a:ext uri="{91240B29-F687-4f45-9708-019B960494DF}">
-                <a14:hiddenLine xmlns="" xmlns:a14="http://schemas.microsoft.com/office/drawing/2010/main" w="9525">
+                <a14:hiddenLine xmlns:a14="http://schemas.microsoft.com/office/drawing/2010/main" xmlns="" w="9525">
                   <a:solidFill>
                     <a:srgbClr val="000000"/>
                   </a:solidFill>
@@ -322,7 +323,7 @@
             </a:ln>
             <a:extLst>
               <a:ext uri="{91240B29-F687-4f45-9708-019B960494DF}">
-                <a14:hiddenLine xmlns="" xmlns:a14="http://schemas.microsoft.com/office/drawing/2010/main" w="9525">
+                <a14:hiddenLine xmlns:a14="http://schemas.microsoft.com/office/drawing/2010/main" xmlns="" w="9525">
                   <a:solidFill>
                     <a:srgbClr val="000000"/>
                   </a:solidFill>
@@ -412,7 +413,7 @@
             </a:ln>
             <a:extLst>
               <a:ext uri="{91240B29-F687-4f45-9708-019B960494DF}">
-                <a14:hiddenLine xmlns="" xmlns:a14="http://schemas.microsoft.com/office/drawing/2010/main" w="9525">
+                <a14:hiddenLine xmlns:a14="http://schemas.microsoft.com/office/drawing/2010/main" xmlns="" w="9525">
                   <a:solidFill>
                     <a:srgbClr val="000000"/>
                   </a:solidFill>
@@ -446,7 +447,7 @@
             </a:ln>
             <a:extLst>
               <a:ext uri="{91240B29-F687-4f45-9708-019B960494DF}">
-                <a14:hiddenLine xmlns="" xmlns:a14="http://schemas.microsoft.com/office/drawing/2010/main" w="9525">
+                <a14:hiddenLine xmlns:a14="http://schemas.microsoft.com/office/drawing/2010/main" xmlns="" w="9525">
                   <a:solidFill>
                     <a:srgbClr val="000000"/>
                   </a:solidFill>
@@ -536,7 +537,7 @@
             </a:ln>
             <a:extLst>
               <a:ext uri="{91240B29-F687-4f45-9708-019B960494DF}">
-                <a14:hiddenLine xmlns="" xmlns:a14="http://schemas.microsoft.com/office/drawing/2010/main" w="9525">
+                <a14:hiddenLine xmlns:a14="http://schemas.microsoft.com/office/drawing/2010/main" xmlns="" w="9525">
                   <a:solidFill>
                     <a:srgbClr val="000000"/>
                   </a:solidFill>
@@ -598,7 +599,7 @@
             </a:ln>
             <a:extLst>
               <a:ext uri="{91240B29-F687-4f45-9708-019B960494DF}">
-                <a14:hiddenLine xmlns="" xmlns:a14="http://schemas.microsoft.com/office/drawing/2010/main" w="9525">
+                <a14:hiddenLine xmlns:a14="http://schemas.microsoft.com/office/drawing/2010/main" xmlns="" w="9525">
                   <a:solidFill>
                     <a:srgbClr val="000000"/>
                   </a:solidFill>
@@ -660,7 +661,7 @@
             </a:ln>
             <a:extLst>
               <a:ext uri="{91240B29-F687-4f45-9708-019B960494DF}">
-                <a14:hiddenLine xmlns="" xmlns:a14="http://schemas.microsoft.com/office/drawing/2010/main" w="9525">
+                <a14:hiddenLine xmlns:a14="http://schemas.microsoft.com/office/drawing/2010/main" xmlns="" w="9525">
                   <a:solidFill>
                     <a:srgbClr val="000000"/>
                   </a:solidFill>
@@ -750,7 +751,7 @@
             </a:ln>
             <a:extLst>
               <a:ext uri="{91240B29-F687-4f45-9708-019B960494DF}">
-                <a14:hiddenLine xmlns="" xmlns:a14="http://schemas.microsoft.com/office/drawing/2010/main" w="9525">
+                <a14:hiddenLine xmlns:a14="http://schemas.microsoft.com/office/drawing/2010/main" xmlns="" w="9525">
                   <a:solidFill>
                     <a:srgbClr val="000000"/>
                   </a:solidFill>
@@ -812,7 +813,7 @@
             </a:ln>
             <a:extLst>
               <a:ext uri="{91240B29-F687-4f45-9708-019B960494DF}">
-                <a14:hiddenLine xmlns="" xmlns:a14="http://schemas.microsoft.com/office/drawing/2010/main" w="9525">
+                <a14:hiddenLine xmlns:a14="http://schemas.microsoft.com/office/drawing/2010/main" xmlns="" w="9525">
                   <a:solidFill>
                     <a:srgbClr val="000000"/>
                   </a:solidFill>
@@ -874,7 +875,7 @@
             </a:ln>
             <a:extLst>
               <a:ext uri="{91240B29-F687-4f45-9708-019B960494DF}">
-                <a14:hiddenLine xmlns="" xmlns:a14="http://schemas.microsoft.com/office/drawing/2010/main" w="9525">
+                <a14:hiddenLine xmlns:a14="http://schemas.microsoft.com/office/drawing/2010/main" xmlns="" w="9525">
                   <a:solidFill>
                     <a:srgbClr val="000000"/>
                   </a:solidFill>
@@ -964,7 +965,7 @@
             </a:ln>
             <a:extLst>
               <a:ext uri="{91240B29-F687-4f45-9708-019B960494DF}">
-                <a14:hiddenLine xmlns="" xmlns:a14="http://schemas.microsoft.com/office/drawing/2010/main" w="9525">
+                <a14:hiddenLine xmlns:a14="http://schemas.microsoft.com/office/drawing/2010/main" xmlns="" w="9525">
                   <a:solidFill>
                     <a:srgbClr val="000000"/>
                   </a:solidFill>
@@ -1054,7 +1055,7 @@
             </a:ln>
             <a:extLst>
               <a:ext uri="{91240B29-F687-4f45-9708-019B960494DF}">
-                <a14:hiddenLine xmlns="" xmlns:a14="http://schemas.microsoft.com/office/drawing/2010/main" w="9525">
+                <a14:hiddenLine xmlns:a14="http://schemas.microsoft.com/office/drawing/2010/main" xmlns="" w="9525">
                   <a:solidFill>
                     <a:srgbClr val="000000"/>
                   </a:solidFill>
@@ -1116,7 +1117,7 @@
             </a:ln>
             <a:extLst>
               <a:ext uri="{91240B29-F687-4f45-9708-019B960494DF}">
-                <a14:hiddenLine xmlns="" xmlns:a14="http://schemas.microsoft.com/office/drawing/2010/main" w="9525">
+                <a14:hiddenLine xmlns:a14="http://schemas.microsoft.com/office/drawing/2010/main" xmlns="" w="9525">
                   <a:solidFill>
                     <a:srgbClr val="000000"/>
                   </a:solidFill>
@@ -1226,7 +1227,7 @@
             </a:ln>
             <a:extLst>
               <a:ext uri="{91240B29-F687-4f45-9708-019B960494DF}">
-                <a14:hiddenLine xmlns="" xmlns:a14="http://schemas.microsoft.com/office/drawing/2010/main" w="9525">
+                <a14:hiddenLine xmlns:a14="http://schemas.microsoft.com/office/drawing/2010/main" xmlns="" w="9525">
                   <a:solidFill>
                     <a:srgbClr val="000000"/>
                   </a:solidFill>
@@ -1288,7 +1289,7 @@
             </a:ln>
             <a:extLst>
               <a:ext uri="{91240B29-F687-4f45-9708-019B960494DF}">
-                <a14:hiddenLine xmlns="" xmlns:a14="http://schemas.microsoft.com/office/drawing/2010/main" w="9525">
+                <a14:hiddenLine xmlns:a14="http://schemas.microsoft.com/office/drawing/2010/main" xmlns="" w="9525">
                   <a:solidFill>
                     <a:srgbClr val="000000"/>
                   </a:solidFill>
@@ -1378,7 +1379,7 @@
             </a:ln>
             <a:extLst>
               <a:ext uri="{91240B29-F687-4f45-9708-019B960494DF}">
-                <a14:hiddenLine xmlns="" xmlns:a14="http://schemas.microsoft.com/office/drawing/2010/main" w="9525">
+                <a14:hiddenLine xmlns:a14="http://schemas.microsoft.com/office/drawing/2010/main" xmlns="" w="9525">
                   <a:solidFill>
                     <a:srgbClr val="000000"/>
                   </a:solidFill>
@@ -1468,7 +1469,7 @@
             </a:ln>
             <a:extLst>
               <a:ext uri="{91240B29-F687-4f45-9708-019B960494DF}">
-                <a14:hiddenLine xmlns="" xmlns:a14="http://schemas.microsoft.com/office/drawing/2010/main" w="9525">
+                <a14:hiddenLine xmlns:a14="http://schemas.microsoft.com/office/drawing/2010/main" xmlns="" w="9525">
                   <a:solidFill>
                     <a:srgbClr val="000000"/>
                   </a:solidFill>
@@ -1530,7 +1531,7 @@
             </a:ln>
             <a:extLst>
               <a:ext uri="{91240B29-F687-4f45-9708-019B960494DF}">
-                <a14:hiddenLine xmlns="" xmlns:a14="http://schemas.microsoft.com/office/drawing/2010/main" w="9525">
+                <a14:hiddenLine xmlns:a14="http://schemas.microsoft.com/office/drawing/2010/main" xmlns="" w="9525">
                   <a:solidFill>
                     <a:srgbClr val="000000"/>
                   </a:solidFill>
@@ -1620,7 +1621,7 @@
             </a:ln>
             <a:extLst>
               <a:ext uri="{91240B29-F687-4f45-9708-019B960494DF}">
-                <a14:hiddenLine xmlns="" xmlns:a14="http://schemas.microsoft.com/office/drawing/2010/main" w="9525">
+                <a14:hiddenLine xmlns:a14="http://schemas.microsoft.com/office/drawing/2010/main" xmlns="" w="9525">
                   <a:solidFill>
                     <a:srgbClr val="000000"/>
                   </a:solidFill>
@@ -1710,7 +1711,7 @@
             </a:ln>
             <a:extLst>
               <a:ext uri="{91240B29-F687-4f45-9708-019B960494DF}">
-                <a14:hiddenLine xmlns="" xmlns:a14="http://schemas.microsoft.com/office/drawing/2010/main" w="9525">
+                <a14:hiddenLine xmlns:a14="http://schemas.microsoft.com/office/drawing/2010/main" xmlns="" w="9525">
                   <a:solidFill>
                     <a:srgbClr val="000000"/>
                   </a:solidFill>
@@ -1766,7 +1767,7 @@
             </a:ln>
             <a:extLst>
               <a:ext uri="{91240B29-F687-4f45-9708-019B960494DF}">
-                <a14:hiddenLine xmlns="" xmlns:a14="http://schemas.microsoft.com/office/drawing/2010/main" w="9525">
+                <a14:hiddenLine xmlns:a14="http://schemas.microsoft.com/office/drawing/2010/main" xmlns="" w="9525">
                   <a:solidFill>
                     <a:srgbClr val="000000"/>
                   </a:solidFill>
@@ -1856,7 +1857,7 @@
             </a:ln>
             <a:extLst>
               <a:ext uri="{91240B29-F687-4f45-9708-019B960494DF}">
-                <a14:hiddenLine xmlns="" xmlns:a14="http://schemas.microsoft.com/office/drawing/2010/main" w="9525">
+                <a14:hiddenLine xmlns:a14="http://schemas.microsoft.com/office/drawing/2010/main" xmlns="" w="9525">
                   <a:solidFill>
                     <a:srgbClr val="000000"/>
                   </a:solidFill>
@@ -1912,7 +1913,7 @@
             </a:ln>
             <a:extLst>
               <a:ext uri="{91240B29-F687-4f45-9708-019B960494DF}">
-                <a14:hiddenLine xmlns="" xmlns:a14="http://schemas.microsoft.com/office/drawing/2010/main" w="9525">
+                <a14:hiddenLine xmlns:a14="http://schemas.microsoft.com/office/drawing/2010/main" xmlns="" w="9525">
                   <a:solidFill>
                     <a:srgbClr val="000000"/>
                   </a:solidFill>
@@ -2002,7 +2003,7 @@
             </a:ln>
             <a:extLst>
               <a:ext uri="{91240B29-F687-4f45-9708-019B960494DF}">
-                <a14:hiddenLine xmlns="" xmlns:a14="http://schemas.microsoft.com/office/drawing/2010/main" w="9525">
+                <a14:hiddenLine xmlns:a14="http://schemas.microsoft.com/office/drawing/2010/main" xmlns="" w="9525">
                   <a:solidFill>
                     <a:srgbClr val="000000"/>
                   </a:solidFill>
@@ -2070,7 +2071,7 @@
             </a:ln>
             <a:extLst>
               <a:ext uri="{91240B29-F687-4f45-9708-019B960494DF}">
-                <a14:hiddenLine xmlns="" xmlns:a14="http://schemas.microsoft.com/office/drawing/2010/main" w="9525">
+                <a14:hiddenLine xmlns:a14="http://schemas.microsoft.com/office/drawing/2010/main" xmlns="" w="9525">
                   <a:solidFill>
                     <a:srgbClr val="000000"/>
                   </a:solidFill>
@@ -2160,7 +2161,7 @@
             </a:ln>
             <a:extLst>
               <a:ext uri="{91240B29-F687-4f45-9708-019B960494DF}">
-                <a14:hiddenLine xmlns="" xmlns:a14="http://schemas.microsoft.com/office/drawing/2010/main" w="9525">
+                <a14:hiddenLine xmlns:a14="http://schemas.microsoft.com/office/drawing/2010/main" xmlns="" w="9525">
                   <a:solidFill>
                     <a:srgbClr val="000000"/>
                   </a:solidFill>
@@ -2228,7 +2229,7 @@
             </a:ln>
             <a:extLst>
               <a:ext uri="{91240B29-F687-4f45-9708-019B960494DF}">
-                <a14:hiddenLine xmlns="" xmlns:a14="http://schemas.microsoft.com/office/drawing/2010/main" w="9525">
+                <a14:hiddenLine xmlns:a14="http://schemas.microsoft.com/office/drawing/2010/main" xmlns="" w="9525">
                   <a:solidFill>
                     <a:srgbClr val="000000"/>
                   </a:solidFill>
@@ -2318,7 +2319,7 @@
             </a:ln>
             <a:extLst>
               <a:ext uri="{91240B29-F687-4f45-9708-019B960494DF}">
-                <a14:hiddenLine xmlns="" xmlns:a14="http://schemas.microsoft.com/office/drawing/2010/main" w="9525">
+                <a14:hiddenLine xmlns:a14="http://schemas.microsoft.com/office/drawing/2010/main" xmlns="" w="9525">
                   <a:solidFill>
                     <a:srgbClr val="000000"/>
                   </a:solidFill>
@@ -2352,7 +2353,7 @@
             </a:ln>
             <a:extLst>
               <a:ext uri="{91240B29-F687-4f45-9708-019B960494DF}">
-                <a14:hiddenLine xmlns="" xmlns:a14="http://schemas.microsoft.com/office/drawing/2010/main" w="9525">
+                <a14:hiddenLine xmlns:a14="http://schemas.microsoft.com/office/drawing/2010/main" xmlns="" w="9525">
                   <a:solidFill>
                     <a:srgbClr val="000000"/>
                   </a:solidFill>
@@ -2442,7 +2443,7 @@
             </a:ln>
             <a:extLst>
               <a:ext uri="{91240B29-F687-4f45-9708-019B960494DF}">
-                <a14:hiddenLine xmlns="" xmlns:a14="http://schemas.microsoft.com/office/drawing/2010/main" w="9525">
+                <a14:hiddenLine xmlns:a14="http://schemas.microsoft.com/office/drawing/2010/main" xmlns="" w="9525">
                   <a:solidFill>
                     <a:srgbClr val="000000"/>
                   </a:solidFill>
@@ -2504,7 +2505,7 @@
             </a:ln>
             <a:extLst>
               <a:ext uri="{91240B29-F687-4f45-9708-019B960494DF}">
-                <a14:hiddenLine xmlns="" xmlns:a14="http://schemas.microsoft.com/office/drawing/2010/main" w="9525">
+                <a14:hiddenLine xmlns:a14="http://schemas.microsoft.com/office/drawing/2010/main" xmlns="" w="9525">
                   <a:solidFill>
                     <a:srgbClr val="000000"/>
                   </a:solidFill>
@@ -2566,7 +2567,7 @@
             </a:ln>
             <a:extLst>
               <a:ext uri="{91240B29-F687-4f45-9708-019B960494DF}">
-                <a14:hiddenLine xmlns="" xmlns:a14="http://schemas.microsoft.com/office/drawing/2010/main" w="9525">
+                <a14:hiddenLine xmlns:a14="http://schemas.microsoft.com/office/drawing/2010/main" xmlns="" w="9525">
                   <a:solidFill>
                     <a:srgbClr val="000000"/>
                   </a:solidFill>
@@ -2656,7 +2657,7 @@
             </a:ln>
             <a:extLst>
               <a:ext uri="{91240B29-F687-4f45-9708-019B960494DF}">
-                <a14:hiddenLine xmlns="" xmlns:a14="http://schemas.microsoft.com/office/drawing/2010/main" w="9525">
+                <a14:hiddenLine xmlns:a14="http://schemas.microsoft.com/office/drawing/2010/main" xmlns="" w="9525">
                   <a:solidFill>
                     <a:srgbClr val="000000"/>
                   </a:solidFill>
@@ -2724,7 +2725,7 @@
             </a:ln>
             <a:extLst>
               <a:ext uri="{91240B29-F687-4f45-9708-019B960494DF}">
-                <a14:hiddenLine xmlns="" xmlns:a14="http://schemas.microsoft.com/office/drawing/2010/main" w="9525">
+                <a14:hiddenLine xmlns:a14="http://schemas.microsoft.com/office/drawing/2010/main" xmlns="" w="9525">
                   <a:solidFill>
                     <a:srgbClr val="000000"/>
                   </a:solidFill>
@@ -2786,7 +2787,7 @@
             </a:ln>
             <a:extLst>
               <a:ext uri="{91240B29-F687-4f45-9708-019B960494DF}">
-                <a14:hiddenLine xmlns="" xmlns:a14="http://schemas.microsoft.com/office/drawing/2010/main" w="9525">
+                <a14:hiddenLine xmlns:a14="http://schemas.microsoft.com/office/drawing/2010/main" xmlns="" w="9525">
                   <a:solidFill>
                     <a:srgbClr val="000000"/>
                   </a:solidFill>
@@ -2876,7 +2877,7 @@
             </a:ln>
             <a:extLst>
               <a:ext uri="{91240B29-F687-4f45-9708-019B960494DF}">
-                <a14:hiddenLine xmlns="" xmlns:a14="http://schemas.microsoft.com/office/drawing/2010/main" w="9525">
+                <a14:hiddenLine xmlns:a14="http://schemas.microsoft.com/office/drawing/2010/main" xmlns="" w="9525">
                   <a:solidFill>
                     <a:srgbClr val="000000"/>
                   </a:solidFill>
@@ -2938,7 +2939,7 @@
             </a:ln>
             <a:extLst>
               <a:ext uri="{91240B29-F687-4f45-9708-019B960494DF}">
-                <a14:hiddenLine xmlns="" xmlns:a14="http://schemas.microsoft.com/office/drawing/2010/main" w="9525">
+                <a14:hiddenLine xmlns:a14="http://schemas.microsoft.com/office/drawing/2010/main" xmlns="" w="9525">
                   <a:solidFill>
                     <a:srgbClr val="000000"/>
                   </a:solidFill>
@@ -3028,7 +3029,7 @@
             </a:ln>
             <a:extLst>
               <a:ext uri="{91240B29-F687-4f45-9708-019B960494DF}">
-                <a14:hiddenLine xmlns="" xmlns:a14="http://schemas.microsoft.com/office/drawing/2010/main" w="9525">
+                <a14:hiddenLine xmlns:a14="http://schemas.microsoft.com/office/drawing/2010/main" xmlns="" w="9525">
                   <a:solidFill>
                     <a:srgbClr val="000000"/>
                   </a:solidFill>
@@ -3090,7 +3091,7 @@
             </a:ln>
             <a:extLst>
               <a:ext uri="{91240B29-F687-4f45-9708-019B960494DF}">
-                <a14:hiddenLine xmlns="" xmlns:a14="http://schemas.microsoft.com/office/drawing/2010/main" w="9525">
+                <a14:hiddenLine xmlns:a14="http://schemas.microsoft.com/office/drawing/2010/main" xmlns="" w="9525">
                   <a:solidFill>
                     <a:srgbClr val="000000"/>
                   </a:solidFill>
@@ -3180,7 +3181,7 @@
             </a:ln>
             <a:extLst>
               <a:ext uri="{91240B29-F687-4f45-9708-019B960494DF}">
-                <a14:hiddenLine xmlns="" xmlns:a14="http://schemas.microsoft.com/office/drawing/2010/main" w="9525">
+                <a14:hiddenLine xmlns:a14="http://schemas.microsoft.com/office/drawing/2010/main" xmlns="" w="9525">
                   <a:solidFill>
                     <a:srgbClr val="000000"/>
                   </a:solidFill>
@@ -3214,7 +3215,7 @@
             </a:ln>
             <a:extLst>
               <a:ext uri="{91240B29-F687-4f45-9708-019B960494DF}">
-                <a14:hiddenLine xmlns="" xmlns:a14="http://schemas.microsoft.com/office/drawing/2010/main" w="9525">
+                <a14:hiddenLine xmlns:a14="http://schemas.microsoft.com/office/drawing/2010/main" xmlns="" w="9525">
                   <a:solidFill>
                     <a:srgbClr val="000000"/>
                   </a:solidFill>
@@ -3279,7 +3280,7 @@
             </a:ln>
             <a:extLst>
               <a:ext uri="{91240B29-F687-4f45-9708-019B960494DF}">
-                <a14:hiddenLine xmlns="" xmlns:a14="http://schemas.microsoft.com/office/drawing/2010/main" w="9525">
+                <a14:hiddenLine xmlns:a14="http://schemas.microsoft.com/office/drawing/2010/main" xmlns="" w="9525">
                   <a:solidFill>
                     <a:srgbClr val="000000"/>
                   </a:solidFill>
@@ -3369,7 +3370,7 @@
             </a:ln>
             <a:extLst>
               <a:ext uri="{91240B29-F687-4f45-9708-019B960494DF}">
-                <a14:hiddenLine xmlns="" xmlns:a14="http://schemas.microsoft.com/office/drawing/2010/main" w="9525">
+                <a14:hiddenLine xmlns:a14="http://schemas.microsoft.com/office/drawing/2010/main" xmlns="" w="9525">
                   <a:solidFill>
                     <a:srgbClr val="000000"/>
                   </a:solidFill>
@@ -3431,7 +3432,7 @@
             </a:ln>
             <a:extLst>
               <a:ext uri="{91240B29-F687-4f45-9708-019B960494DF}">
-                <a14:hiddenLine xmlns="" xmlns:a14="http://schemas.microsoft.com/office/drawing/2010/main" w="9525">
+                <a14:hiddenLine xmlns:a14="http://schemas.microsoft.com/office/drawing/2010/main" xmlns="" w="9525">
                   <a:solidFill>
                     <a:srgbClr val="000000"/>
                   </a:solidFill>
@@ -3521,7 +3522,7 @@
             </a:ln>
             <a:extLst>
               <a:ext uri="{91240B29-F687-4f45-9708-019B960494DF}">
-                <a14:hiddenLine xmlns="" xmlns:a14="http://schemas.microsoft.com/office/drawing/2010/main" w="9525">
+                <a14:hiddenLine xmlns:a14="http://schemas.microsoft.com/office/drawing/2010/main" xmlns="" w="9525">
                   <a:solidFill>
                     <a:srgbClr val="000000"/>
                   </a:solidFill>
@@ -3611,7 +3612,7 @@
             </a:ln>
             <a:extLst>
               <a:ext uri="{91240B29-F687-4f45-9708-019B960494DF}">
-                <a14:hiddenLine xmlns="" xmlns:a14="http://schemas.microsoft.com/office/drawing/2010/main" w="9525">
+                <a14:hiddenLine xmlns:a14="http://schemas.microsoft.com/office/drawing/2010/main" xmlns="" w="9525">
                   <a:solidFill>
                     <a:srgbClr val="000000"/>
                   </a:solidFill>
@@ -3676,7 +3677,7 @@
             </a:ln>
             <a:extLst>
               <a:ext uri="{91240B29-F687-4f45-9708-019B960494DF}">
-                <a14:hiddenLine xmlns="" xmlns:a14="http://schemas.microsoft.com/office/drawing/2010/main" w="9525">
+                <a14:hiddenLine xmlns:a14="http://schemas.microsoft.com/office/drawing/2010/main" xmlns="" w="9525">
                   <a:solidFill>
                     <a:srgbClr val="000000"/>
                   </a:solidFill>
@@ -3738,7 +3739,7 @@
             </a:ln>
             <a:extLst>
               <a:ext uri="{91240B29-F687-4f45-9708-019B960494DF}">
-                <a14:hiddenLine xmlns="" xmlns:a14="http://schemas.microsoft.com/office/drawing/2010/main" w="9525">
+                <a14:hiddenLine xmlns:a14="http://schemas.microsoft.com/office/drawing/2010/main" xmlns="" w="9525">
                   <a:solidFill>
                     <a:srgbClr val="000000"/>
                   </a:solidFill>
@@ -3828,7 +3829,7 @@
             </a:ln>
             <a:extLst>
               <a:ext uri="{91240B29-F687-4f45-9708-019B960494DF}">
-                <a14:hiddenLine xmlns="" xmlns:a14="http://schemas.microsoft.com/office/drawing/2010/main" w="9525">
+                <a14:hiddenLine xmlns:a14="http://schemas.microsoft.com/office/drawing/2010/main" xmlns="" w="9525">
                   <a:solidFill>
                     <a:srgbClr val="000000"/>
                   </a:solidFill>
@@ -3918,7 +3919,7 @@
             </a:ln>
             <a:extLst>
               <a:ext uri="{91240B29-F687-4f45-9708-019B960494DF}">
-                <a14:hiddenLine xmlns="" xmlns:a14="http://schemas.microsoft.com/office/drawing/2010/main" w="9525">
+                <a14:hiddenLine xmlns:a14="http://schemas.microsoft.com/office/drawing/2010/main" xmlns="" w="9525">
                   <a:solidFill>
                     <a:srgbClr val="000000"/>
                   </a:solidFill>
@@ -3980,7 +3981,7 @@
             </a:ln>
             <a:extLst>
               <a:ext uri="{91240B29-F687-4f45-9708-019B960494DF}">
-                <a14:hiddenLine xmlns="" xmlns:a14="http://schemas.microsoft.com/office/drawing/2010/main" w="9525">
+                <a14:hiddenLine xmlns:a14="http://schemas.microsoft.com/office/drawing/2010/main" xmlns="" w="9525">
                   <a:solidFill>
                     <a:srgbClr val="000000"/>
                   </a:solidFill>
@@ -4100,7 +4101,7 @@
             </a:ln>
             <a:extLst>
               <a:ext uri="{91240B29-F687-4f45-9708-019B960494DF}">
-                <a14:hiddenLine xmlns="" xmlns:a14="http://schemas.microsoft.com/office/drawing/2010/main" w="9525">
+                <a14:hiddenLine xmlns:a14="http://schemas.microsoft.com/office/drawing/2010/main" xmlns="" w="9525">
                   <a:solidFill>
                     <a:srgbClr val="000000"/>
                   </a:solidFill>
@@ -4168,7 +4169,7 @@
             </a:ln>
             <a:extLst>
               <a:ext uri="{91240B29-F687-4f45-9708-019B960494DF}">
-                <a14:hiddenLine xmlns="" xmlns:a14="http://schemas.microsoft.com/office/drawing/2010/main" w="9525">
+                <a14:hiddenLine xmlns:a14="http://schemas.microsoft.com/office/drawing/2010/main" xmlns="" w="9525">
                   <a:solidFill>
                     <a:srgbClr val="000000"/>
                   </a:solidFill>
@@ -4258,7 +4259,7 @@
             </a:ln>
             <a:extLst>
               <a:ext uri="{91240B29-F687-4f45-9708-019B960494DF}">
-                <a14:hiddenLine xmlns="" xmlns:a14="http://schemas.microsoft.com/office/drawing/2010/main" w="9525">
+                <a14:hiddenLine xmlns:a14="http://schemas.microsoft.com/office/drawing/2010/main" xmlns="" w="9525">
                   <a:solidFill>
                     <a:srgbClr val="000000"/>
                   </a:solidFill>
@@ -4398,7 +4399,7 @@
           <a:p>
             <a:fld id="{896DB8EA-4B77-48E2-8F2A-873A9F82D9F4}" type="datetimeFigureOut">
               <a:rPr lang="en-US" smtClean="0"/>
-              <a:t>5/20/2019</a:t>
+              <a:t>5/21/2019</a:t>
             </a:fld>
             <a:endParaRPr lang="en-US"/>
           </a:p>
@@ -4665,7 +4666,7 @@
           <a:p>
             <a:fld id="{896DB8EA-4B77-48E2-8F2A-873A9F82D9F4}" type="datetimeFigureOut">
               <a:rPr lang="en-US" smtClean="0"/>
-              <a:t>5/20/2019</a:t>
+              <a:t>5/21/2019</a:t>
             </a:fld>
             <a:endParaRPr lang="en-US"/>
           </a:p>
@@ -4861,7 +4862,7 @@
           <a:p>
             <a:fld id="{896DB8EA-4B77-48E2-8F2A-873A9F82D9F4}" type="datetimeFigureOut">
               <a:rPr lang="en-US" smtClean="0"/>
-              <a:t>5/20/2019</a:t>
+              <a:t>5/21/2019</a:t>
             </a:fld>
             <a:endParaRPr lang="en-US"/>
           </a:p>
@@ -5124,7 +5125,7 @@
           <a:p>
             <a:fld id="{896DB8EA-4B77-48E2-8F2A-873A9F82D9F4}" type="datetimeFigureOut">
               <a:rPr lang="en-US" smtClean="0"/>
-              <a:t>5/20/2019</a:t>
+              <a:t>5/21/2019</a:t>
             </a:fld>
             <a:endParaRPr lang="en-US"/>
           </a:p>
@@ -5558,7 +5559,7 @@
           <a:p>
             <a:fld id="{896DB8EA-4B77-48E2-8F2A-873A9F82D9F4}" type="datetimeFigureOut">
               <a:rPr lang="en-US" smtClean="0"/>
-              <a:t>5/20/2019</a:t>
+              <a:t>5/21/2019</a:t>
             </a:fld>
             <a:endParaRPr lang="en-US"/>
           </a:p>
@@ -6104,7 +6105,7 @@
           <a:p>
             <a:fld id="{896DB8EA-4B77-48E2-8F2A-873A9F82D9F4}" type="datetimeFigureOut">
               <a:rPr lang="en-US" smtClean="0"/>
-              <a:t>5/20/2019</a:t>
+              <a:t>5/21/2019</a:t>
             </a:fld>
             <a:endParaRPr lang="en-US"/>
           </a:p>
@@ -6824,7 +6825,7 @@
           <a:p>
             <a:fld id="{896DB8EA-4B77-48E2-8F2A-873A9F82D9F4}" type="datetimeFigureOut">
               <a:rPr lang="en-US" smtClean="0"/>
-              <a:t>5/20/2019</a:t>
+              <a:t>5/21/2019</a:t>
             </a:fld>
             <a:endParaRPr lang="en-US"/>
           </a:p>
@@ -6994,7 +6995,7 @@
           <a:p>
             <a:fld id="{896DB8EA-4B77-48E2-8F2A-873A9F82D9F4}" type="datetimeFigureOut">
               <a:rPr lang="en-US" smtClean="0"/>
-              <a:t>5/20/2019</a:t>
+              <a:t>5/21/2019</a:t>
             </a:fld>
             <a:endParaRPr lang="en-US"/>
           </a:p>
@@ -7174,7 +7175,7 @@
           <a:p>
             <a:fld id="{896DB8EA-4B77-48E2-8F2A-873A9F82D9F4}" type="datetimeFigureOut">
               <a:rPr lang="en-US" smtClean="0"/>
-              <a:t>5/20/2019</a:t>
+              <a:t>5/21/2019</a:t>
             </a:fld>
             <a:endParaRPr lang="en-US"/>
           </a:p>
@@ -7344,7 +7345,7 @@
           <a:p>
             <a:fld id="{896DB8EA-4B77-48E2-8F2A-873A9F82D9F4}" type="datetimeFigureOut">
               <a:rPr lang="en-US" smtClean="0"/>
-              <a:t>5/20/2019</a:t>
+              <a:t>5/21/2019</a:t>
             </a:fld>
             <a:endParaRPr lang="en-US"/>
           </a:p>
@@ -7594,7 +7595,7 @@
           <a:p>
             <a:fld id="{896DB8EA-4B77-48E2-8F2A-873A9F82D9F4}" type="datetimeFigureOut">
               <a:rPr lang="en-US" smtClean="0"/>
-              <a:t>5/20/2019</a:t>
+              <a:t>5/21/2019</a:t>
             </a:fld>
             <a:endParaRPr lang="en-US"/>
           </a:p>
@@ -7826,7 +7827,7 @@
           <a:p>
             <a:fld id="{896DB8EA-4B77-48E2-8F2A-873A9F82D9F4}" type="datetimeFigureOut">
               <a:rPr lang="en-US" smtClean="0"/>
-              <a:t>5/20/2019</a:t>
+              <a:t>5/21/2019</a:t>
             </a:fld>
             <a:endParaRPr lang="en-US"/>
           </a:p>
@@ -8207,7 +8208,7 @@
           <a:p>
             <a:fld id="{896DB8EA-4B77-48E2-8F2A-873A9F82D9F4}" type="datetimeFigureOut">
               <a:rPr lang="en-US" smtClean="0"/>
-              <a:t>5/20/2019</a:t>
+              <a:t>5/21/2019</a:t>
             </a:fld>
             <a:endParaRPr lang="en-US"/>
           </a:p>
@@ -8325,7 +8326,7 @@
           <a:p>
             <a:fld id="{896DB8EA-4B77-48E2-8F2A-873A9F82D9F4}" type="datetimeFigureOut">
               <a:rPr lang="en-US" smtClean="0"/>
-              <a:t>5/20/2019</a:t>
+              <a:t>5/21/2019</a:t>
             </a:fld>
             <a:endParaRPr lang="en-US"/>
           </a:p>
@@ -8420,7 +8421,7 @@
           <a:p>
             <a:fld id="{896DB8EA-4B77-48E2-8F2A-873A9F82D9F4}" type="datetimeFigureOut">
               <a:rPr lang="en-US" smtClean="0"/>
-              <a:t>5/20/2019</a:t>
+              <a:t>5/21/2019</a:t>
             </a:fld>
             <a:endParaRPr lang="en-US"/>
           </a:p>
@@ -8669,7 +8670,7 @@
           <a:p>
             <a:fld id="{896DB8EA-4B77-48E2-8F2A-873A9F82D9F4}" type="datetimeFigureOut">
               <a:rPr lang="en-US" smtClean="0"/>
-              <a:t>5/20/2019</a:t>
+              <a:t>5/21/2019</a:t>
             </a:fld>
             <a:endParaRPr lang="en-US"/>
           </a:p>
@@ -8949,7 +8950,7 @@
           <a:p>
             <a:fld id="{896DB8EA-4B77-48E2-8F2A-873A9F82D9F4}" type="datetimeFigureOut">
               <a:rPr lang="en-US" smtClean="0"/>
-              <a:t>5/20/2019</a:t>
+              <a:t>5/21/2019</a:t>
             </a:fld>
             <a:endParaRPr lang="en-US"/>
           </a:p>
@@ -9065,7 +9066,7 @@
           <a:noFill/>
           <a:extLst>
             <a:ext uri="{909E8E84-426E-40dd-AFC4-6F175D3DCCD1}">
-              <a14:hiddenFill xmlns="" xmlns:a14="http://schemas.microsoft.com/office/drawing/2010/main">
+              <a14:hiddenFill xmlns:a14="http://schemas.microsoft.com/office/drawing/2010/main" xmlns="">
                 <a:solidFill>
                   <a:srgbClr val="FFFFFF"/>
                 </a:solidFill>
@@ -9139,7 +9140,7 @@
               </a:ln>
               <a:extLst>
                 <a:ext uri="{91240B29-F687-4f45-9708-019B960494DF}">
-                  <a14:hiddenLine xmlns="" xmlns:a14="http://schemas.microsoft.com/office/drawing/2010/main" w="9525">
+                  <a14:hiddenLine xmlns:a14="http://schemas.microsoft.com/office/drawing/2010/main" xmlns="" w="9525">
                     <a:solidFill>
                       <a:srgbClr val="000000"/>
                     </a:solidFill>
@@ -9229,7 +9230,7 @@
               </a:ln>
               <a:extLst>
                 <a:ext uri="{91240B29-F687-4f45-9708-019B960494DF}">
-                  <a14:hiddenLine xmlns="" xmlns:a14="http://schemas.microsoft.com/office/drawing/2010/main" w="9525">
+                  <a14:hiddenLine xmlns:a14="http://schemas.microsoft.com/office/drawing/2010/main" xmlns="" w="9525">
                     <a:solidFill>
                       <a:srgbClr val="000000"/>
                     </a:solidFill>
@@ -9319,7 +9320,7 @@
               </a:ln>
               <a:extLst>
                 <a:ext uri="{91240B29-F687-4f45-9708-019B960494DF}">
-                  <a14:hiddenLine xmlns="" xmlns:a14="http://schemas.microsoft.com/office/drawing/2010/main" w="9525">
+                  <a14:hiddenLine xmlns:a14="http://schemas.microsoft.com/office/drawing/2010/main" xmlns="" w="9525">
                     <a:solidFill>
                       <a:srgbClr val="000000"/>
                     </a:solidFill>
@@ -9381,7 +9382,7 @@
               </a:ln>
               <a:extLst>
                 <a:ext uri="{91240B29-F687-4f45-9708-019B960494DF}">
-                  <a14:hiddenLine xmlns="" xmlns:a14="http://schemas.microsoft.com/office/drawing/2010/main" w="9525">
+                  <a14:hiddenLine xmlns:a14="http://schemas.microsoft.com/office/drawing/2010/main" xmlns="" w="9525">
                     <a:solidFill>
                       <a:srgbClr val="000000"/>
                     </a:solidFill>
@@ -9471,7 +9472,7 @@
               </a:ln>
               <a:extLst>
                 <a:ext uri="{91240B29-F687-4f45-9708-019B960494DF}">
-                  <a14:hiddenLine xmlns="" xmlns:a14="http://schemas.microsoft.com/office/drawing/2010/main" w="9525">
+                  <a14:hiddenLine xmlns:a14="http://schemas.microsoft.com/office/drawing/2010/main" xmlns="" w="9525">
                     <a:solidFill>
                       <a:srgbClr val="000000"/>
                     </a:solidFill>
@@ -9533,7 +9534,7 @@
               </a:ln>
               <a:extLst>
                 <a:ext uri="{91240B29-F687-4f45-9708-019B960494DF}">
-                  <a14:hiddenLine xmlns="" xmlns:a14="http://schemas.microsoft.com/office/drawing/2010/main" w="9525">
+                  <a14:hiddenLine xmlns:a14="http://schemas.microsoft.com/office/drawing/2010/main" xmlns="" w="9525">
                     <a:solidFill>
                       <a:srgbClr val="000000"/>
                     </a:solidFill>
@@ -9595,7 +9596,7 @@
               </a:ln>
               <a:extLst>
                 <a:ext uri="{91240B29-F687-4f45-9708-019B960494DF}">
-                  <a14:hiddenLine xmlns="" xmlns:a14="http://schemas.microsoft.com/office/drawing/2010/main" w="9525">
+                  <a14:hiddenLine xmlns:a14="http://schemas.microsoft.com/office/drawing/2010/main" xmlns="" w="9525">
                     <a:solidFill>
                       <a:srgbClr val="000000"/>
                     </a:solidFill>
@@ -9685,7 +9686,7 @@
               </a:ln>
               <a:extLst>
                 <a:ext uri="{91240B29-F687-4f45-9708-019B960494DF}">
-                  <a14:hiddenLine xmlns="" xmlns:a14="http://schemas.microsoft.com/office/drawing/2010/main" w="9525">
+                  <a14:hiddenLine xmlns:a14="http://schemas.microsoft.com/office/drawing/2010/main" xmlns="" w="9525">
                     <a:solidFill>
                       <a:srgbClr val="000000"/>
                     </a:solidFill>
@@ -9775,7 +9776,7 @@
               </a:ln>
               <a:extLst>
                 <a:ext uri="{91240B29-F687-4f45-9708-019B960494DF}">
-                  <a14:hiddenLine xmlns="" xmlns:a14="http://schemas.microsoft.com/office/drawing/2010/main" w="9525">
+                  <a14:hiddenLine xmlns:a14="http://schemas.microsoft.com/office/drawing/2010/main" xmlns="" w="9525">
                     <a:solidFill>
                       <a:srgbClr val="000000"/>
                     </a:solidFill>
@@ -9837,7 +9838,7 @@
               </a:ln>
               <a:extLst>
                 <a:ext uri="{91240B29-F687-4f45-9708-019B960494DF}">
-                  <a14:hiddenLine xmlns="" xmlns:a14="http://schemas.microsoft.com/office/drawing/2010/main" w="9525">
+                  <a14:hiddenLine xmlns:a14="http://schemas.microsoft.com/office/drawing/2010/main" xmlns="" w="9525">
                     <a:solidFill>
                       <a:srgbClr val="000000"/>
                     </a:solidFill>
@@ -9947,7 +9948,7 @@
               </a:ln>
               <a:extLst>
                 <a:ext uri="{91240B29-F687-4f45-9708-019B960494DF}">
-                  <a14:hiddenLine xmlns="" xmlns:a14="http://schemas.microsoft.com/office/drawing/2010/main" w="9525">
+                  <a14:hiddenLine xmlns:a14="http://schemas.microsoft.com/office/drawing/2010/main" xmlns="" w="9525">
                     <a:solidFill>
                       <a:srgbClr val="000000"/>
                     </a:solidFill>
@@ -10031,7 +10032,7 @@
               </a:ln>
               <a:extLst>
                 <a:ext uri="{91240B29-F687-4f45-9708-019B960494DF}">
-                  <a14:hiddenLine xmlns="" xmlns:a14="http://schemas.microsoft.com/office/drawing/2010/main" w="9525">
+                  <a14:hiddenLine xmlns:a14="http://schemas.microsoft.com/office/drawing/2010/main" xmlns="" w="9525">
                     <a:solidFill>
                       <a:srgbClr val="000000"/>
                     </a:solidFill>
@@ -10093,7 +10094,7 @@
               </a:ln>
               <a:extLst>
                 <a:ext uri="{91240B29-F687-4f45-9708-019B960494DF}">
-                  <a14:hiddenLine xmlns="" xmlns:a14="http://schemas.microsoft.com/office/drawing/2010/main" w="9525">
+                  <a14:hiddenLine xmlns:a14="http://schemas.microsoft.com/office/drawing/2010/main" xmlns="" w="9525">
                     <a:solidFill>
                       <a:srgbClr val="000000"/>
                     </a:solidFill>
@@ -10155,7 +10156,7 @@
               </a:ln>
               <a:extLst>
                 <a:ext uri="{91240B29-F687-4f45-9708-019B960494DF}">
-                  <a14:hiddenLine xmlns="" xmlns:a14="http://schemas.microsoft.com/office/drawing/2010/main" w="9525">
+                  <a14:hiddenLine xmlns:a14="http://schemas.microsoft.com/office/drawing/2010/main" xmlns="" w="9525">
                     <a:solidFill>
                       <a:srgbClr val="000000"/>
                     </a:solidFill>
@@ -10245,7 +10246,7 @@
               </a:ln>
               <a:extLst>
                 <a:ext uri="{91240B29-F687-4f45-9708-019B960494DF}">
-                  <a14:hiddenLine xmlns="" xmlns:a14="http://schemas.microsoft.com/office/drawing/2010/main" w="9525">
+                  <a14:hiddenLine xmlns:a14="http://schemas.microsoft.com/office/drawing/2010/main" xmlns="" w="9525">
                     <a:solidFill>
                       <a:srgbClr val="000000"/>
                     </a:solidFill>
@@ -10279,7 +10280,7 @@
               </a:ln>
               <a:extLst>
                 <a:ext uri="{91240B29-F687-4f45-9708-019B960494DF}">
-                  <a14:hiddenLine xmlns="" xmlns:a14="http://schemas.microsoft.com/office/drawing/2010/main" w="9525">
+                  <a14:hiddenLine xmlns:a14="http://schemas.microsoft.com/office/drawing/2010/main" xmlns="" w="9525">
                     <a:solidFill>
                       <a:srgbClr val="000000"/>
                     </a:solidFill>
@@ -10344,7 +10345,7 @@
               </a:ln>
               <a:extLst>
                 <a:ext uri="{91240B29-F687-4f45-9708-019B960494DF}">
-                  <a14:hiddenLine xmlns="" xmlns:a14="http://schemas.microsoft.com/office/drawing/2010/main" w="9525">
+                  <a14:hiddenLine xmlns:a14="http://schemas.microsoft.com/office/drawing/2010/main" xmlns="" w="9525">
                     <a:solidFill>
                       <a:srgbClr val="000000"/>
                     </a:solidFill>
@@ -10434,7 +10435,7 @@
               </a:ln>
               <a:extLst>
                 <a:ext uri="{91240B29-F687-4f45-9708-019B960494DF}">
-                  <a14:hiddenLine xmlns="" xmlns:a14="http://schemas.microsoft.com/office/drawing/2010/main" w="9525">
+                  <a14:hiddenLine xmlns:a14="http://schemas.microsoft.com/office/drawing/2010/main" xmlns="" w="9525">
                     <a:solidFill>
                       <a:srgbClr val="000000"/>
                     </a:solidFill>
@@ -10496,7 +10497,7 @@
               </a:ln>
               <a:extLst>
                 <a:ext uri="{91240B29-F687-4f45-9708-019B960494DF}">
-                  <a14:hiddenLine xmlns="" xmlns:a14="http://schemas.microsoft.com/office/drawing/2010/main" w="9525">
+                  <a14:hiddenLine xmlns:a14="http://schemas.microsoft.com/office/drawing/2010/main" xmlns="" w="9525">
                     <a:solidFill>
                       <a:srgbClr val="000000"/>
                     </a:solidFill>
@@ -10586,7 +10587,7 @@
               </a:ln>
               <a:extLst>
                 <a:ext uri="{91240B29-F687-4f45-9708-019B960494DF}">
-                  <a14:hiddenLine xmlns="" xmlns:a14="http://schemas.microsoft.com/office/drawing/2010/main" w="9525">
+                  <a14:hiddenLine xmlns:a14="http://schemas.microsoft.com/office/drawing/2010/main" xmlns="" w="9525">
                     <a:solidFill>
                       <a:srgbClr val="000000"/>
                     </a:solidFill>
@@ -10651,7 +10652,7 @@
               </a:ln>
               <a:extLst>
                 <a:ext uri="{91240B29-F687-4f45-9708-019B960494DF}">
-                  <a14:hiddenLine xmlns="" xmlns:a14="http://schemas.microsoft.com/office/drawing/2010/main" w="9525">
+                  <a14:hiddenLine xmlns:a14="http://schemas.microsoft.com/office/drawing/2010/main" xmlns="" w="9525">
                     <a:solidFill>
                       <a:srgbClr val="000000"/>
                     </a:solidFill>
@@ -10713,7 +10714,7 @@
               </a:ln>
               <a:extLst>
                 <a:ext uri="{91240B29-F687-4f45-9708-019B960494DF}">
-                  <a14:hiddenLine xmlns="" xmlns:a14="http://schemas.microsoft.com/office/drawing/2010/main" w="9525">
+                  <a14:hiddenLine xmlns:a14="http://schemas.microsoft.com/office/drawing/2010/main" xmlns="" w="9525">
                     <a:solidFill>
                       <a:srgbClr val="000000"/>
                     </a:solidFill>
@@ -10803,7 +10804,7 @@
               </a:ln>
               <a:extLst>
                 <a:ext uri="{91240B29-F687-4f45-9708-019B960494DF}">
-                  <a14:hiddenLine xmlns="" xmlns:a14="http://schemas.microsoft.com/office/drawing/2010/main" w="9525">
+                  <a14:hiddenLine xmlns:a14="http://schemas.microsoft.com/office/drawing/2010/main" xmlns="" w="9525">
                     <a:solidFill>
                       <a:srgbClr val="000000"/>
                     </a:solidFill>
@@ -10893,7 +10894,7 @@
               </a:ln>
               <a:extLst>
                 <a:ext uri="{91240B29-F687-4f45-9708-019B960494DF}">
-                  <a14:hiddenLine xmlns="" xmlns:a14="http://schemas.microsoft.com/office/drawing/2010/main" w="9525">
+                  <a14:hiddenLine xmlns:a14="http://schemas.microsoft.com/office/drawing/2010/main" xmlns="" w="9525">
                     <a:solidFill>
                       <a:srgbClr val="000000"/>
                     </a:solidFill>
@@ -10958,7 +10959,7 @@
               </a:ln>
               <a:extLst>
                 <a:ext uri="{91240B29-F687-4f45-9708-019B960494DF}">
-                  <a14:hiddenLine xmlns="" xmlns:a14="http://schemas.microsoft.com/office/drawing/2010/main" w="9525">
+                  <a14:hiddenLine xmlns:a14="http://schemas.microsoft.com/office/drawing/2010/main" xmlns="" w="9525">
                     <a:solidFill>
                       <a:srgbClr val="000000"/>
                     </a:solidFill>
@@ -11078,7 +11079,7 @@
               </a:ln>
               <a:extLst>
                 <a:ext uri="{91240B29-F687-4f45-9708-019B960494DF}">
-                  <a14:hiddenLine xmlns="" xmlns:a14="http://schemas.microsoft.com/office/drawing/2010/main" w="9525">
+                  <a14:hiddenLine xmlns:a14="http://schemas.microsoft.com/office/drawing/2010/main" xmlns="" w="9525">
                     <a:solidFill>
                       <a:srgbClr val="000000"/>
                     </a:solidFill>
@@ -11176,7 +11177,7 @@
               </a:ln>
               <a:extLst>
                 <a:ext uri="{91240B29-F687-4f45-9708-019B960494DF}">
-                  <a14:hiddenLine xmlns="" xmlns:a14="http://schemas.microsoft.com/office/drawing/2010/main" w="9525">
+                  <a14:hiddenLine xmlns:a14="http://schemas.microsoft.com/office/drawing/2010/main" xmlns="" w="9525">
                     <a:solidFill>
                       <a:srgbClr val="000000"/>
                     </a:solidFill>
@@ -11291,7 +11292,7 @@
               </a:ln>
               <a:extLst>
                 <a:ext uri="{91240B29-F687-4f45-9708-019B960494DF}">
-                  <a14:hiddenLine xmlns="" xmlns:a14="http://schemas.microsoft.com/office/drawing/2010/main" w="9525">
+                  <a14:hiddenLine xmlns:a14="http://schemas.microsoft.com/office/drawing/2010/main" xmlns="" w="9525">
                     <a:solidFill>
                       <a:srgbClr val="000000"/>
                     </a:solidFill>
@@ -11381,7 +11382,7 @@
               </a:ln>
               <a:extLst>
                 <a:ext uri="{91240B29-F687-4f45-9708-019B960494DF}">
-                  <a14:hiddenLine xmlns="" xmlns:a14="http://schemas.microsoft.com/office/drawing/2010/main" w="9525">
+                  <a14:hiddenLine xmlns:a14="http://schemas.microsoft.com/office/drawing/2010/main" xmlns="" w="9525">
                     <a:solidFill>
                       <a:srgbClr val="000000"/>
                     </a:solidFill>
@@ -11446,7 +11447,7 @@
               </a:ln>
               <a:extLst>
                 <a:ext uri="{91240B29-F687-4f45-9708-019B960494DF}">
-                  <a14:hiddenLine xmlns="" xmlns:a14="http://schemas.microsoft.com/office/drawing/2010/main" w="9525">
+                  <a14:hiddenLine xmlns:a14="http://schemas.microsoft.com/office/drawing/2010/main" xmlns="" w="9525">
                     <a:solidFill>
                       <a:srgbClr val="000000"/>
                     </a:solidFill>
@@ -11536,7 +11537,7 @@
               </a:ln>
               <a:extLst>
                 <a:ext uri="{91240B29-F687-4f45-9708-019B960494DF}">
-                  <a14:hiddenLine xmlns="" xmlns:a14="http://schemas.microsoft.com/office/drawing/2010/main" w="9525">
+                  <a14:hiddenLine xmlns:a14="http://schemas.microsoft.com/office/drawing/2010/main" xmlns="" w="9525">
                     <a:solidFill>
                       <a:srgbClr val="000000"/>
                     </a:solidFill>
@@ -11604,7 +11605,7 @@
               </a:ln>
               <a:extLst>
                 <a:ext uri="{91240B29-F687-4f45-9708-019B960494DF}">
-                  <a14:hiddenLine xmlns="" xmlns:a14="http://schemas.microsoft.com/office/drawing/2010/main" w="9525">
+                  <a14:hiddenLine xmlns:a14="http://schemas.microsoft.com/office/drawing/2010/main" xmlns="" w="9525">
                     <a:solidFill>
                       <a:srgbClr val="000000"/>
                     </a:solidFill>
@@ -11694,7 +11695,7 @@
               </a:ln>
               <a:extLst>
                 <a:ext uri="{91240B29-F687-4f45-9708-019B960494DF}">
-                  <a14:hiddenLine xmlns="" xmlns:a14="http://schemas.microsoft.com/office/drawing/2010/main" w="9525">
+                  <a14:hiddenLine xmlns:a14="http://schemas.microsoft.com/office/drawing/2010/main" xmlns="" w="9525">
                     <a:solidFill>
                       <a:srgbClr val="000000"/>
                     </a:solidFill>
@@ -11762,7 +11763,7 @@
               </a:ln>
               <a:extLst>
                 <a:ext uri="{91240B29-F687-4f45-9708-019B960494DF}">
-                  <a14:hiddenLine xmlns="" xmlns:a14="http://schemas.microsoft.com/office/drawing/2010/main" w="9525">
+                  <a14:hiddenLine xmlns:a14="http://schemas.microsoft.com/office/drawing/2010/main" xmlns="" w="9525">
                     <a:solidFill>
                       <a:srgbClr val="000000"/>
                     </a:solidFill>
@@ -11852,7 +11853,7 @@
               </a:ln>
               <a:extLst>
                 <a:ext uri="{91240B29-F687-4f45-9708-019B960494DF}">
-                  <a14:hiddenLine xmlns="" xmlns:a14="http://schemas.microsoft.com/office/drawing/2010/main" w="9525">
+                  <a14:hiddenLine xmlns:a14="http://schemas.microsoft.com/office/drawing/2010/main" xmlns="" w="9525">
                     <a:solidFill>
                       <a:srgbClr val="000000"/>
                     </a:solidFill>
@@ -11886,7 +11887,7 @@
               </a:ln>
               <a:extLst>
                 <a:ext uri="{91240B29-F687-4f45-9708-019B960494DF}">
-                  <a14:hiddenLine xmlns="" xmlns:a14="http://schemas.microsoft.com/office/drawing/2010/main" w="9525">
+                  <a14:hiddenLine xmlns:a14="http://schemas.microsoft.com/office/drawing/2010/main" xmlns="" w="9525">
                     <a:solidFill>
                       <a:srgbClr val="000000"/>
                     </a:solidFill>
@@ -12026,7 +12027,7 @@
           <a:p>
             <a:fld id="{896DB8EA-4B77-48E2-8F2A-873A9F82D9F4}" type="datetimeFigureOut">
               <a:rPr lang="en-US" smtClean="0"/>
-              <a:t>5/20/2019</a:t>
+              <a:t>5/21/2019</a:t>
             </a:fld>
             <a:endParaRPr lang="en-US"/>
           </a:p>
@@ -12539,6 +12540,87 @@
           <a:p>
             <a:r>
               <a:rPr lang="en-GB" dirty="0"/>
+              <a:t>Conclusion</a:t>
+            </a:r>
+            <a:endParaRPr lang="en-US" dirty="0"/>
+          </a:p>
+        </p:txBody>
+      </p:sp>
+      <p:sp>
+        <p:nvSpPr>
+          <p:cNvPr id="3" name="Content Placeholder 2"/>
+          <p:cNvSpPr>
+            <a:spLocks noGrp="1"/>
+          </p:cNvSpPr>
+          <p:nvPr>
+            <p:ph idx="1"/>
+          </p:nvPr>
+        </p:nvSpPr>
+        <p:spPr/>
+        <p:txBody>
+          <a:bodyPr/>
+          <a:lstStyle/>
+          <a:p>
+            <a:r>
+              <a:rPr lang="en-US" dirty="0"/>
+              <a:t>The theories talked about show different aspects of the game and how it reflects to the player from; experience through difficulty, game flow and emotional investment. </a:t>
+            </a:r>
+          </a:p>
+          <a:p>
+            <a:r>
+              <a:rPr lang="en-US" dirty="0"/>
+              <a:t>Though the game does follow these theories it does not dedicate itself to prove these theories, instead it is flexible and allows more theories to be implemented in later if needed.   </a:t>
+            </a:r>
+          </a:p>
+        </p:txBody>
+      </p:sp>
+    </p:spTree>
+    <p:extLst>
+      <p:ext uri="{BB962C8B-B14F-4D97-AF65-F5344CB8AC3E}">
+        <p14:creationId xmlns:p14="http://schemas.microsoft.com/office/powerpoint/2010/main" val="675517695"/>
+      </p:ext>
+    </p:extLst>
+  </p:cSld>
+  <p:clrMapOvr>
+    <a:masterClrMapping/>
+  </p:clrMapOvr>
+</p:sld>
+</file>
+
+<file path=ppt/slides/slide11.xml><?xml version="1.0" encoding="utf-8"?>
+<p:sld xmlns:a="http://schemas.openxmlformats.org/drawingml/2006/main" xmlns:r="http://schemas.openxmlformats.org/officeDocument/2006/relationships" xmlns:p="http://schemas.openxmlformats.org/presentationml/2006/main">
+  <p:cSld>
+    <p:spTree>
+      <p:nvGrpSpPr>
+        <p:cNvPr id="1" name=""/>
+        <p:cNvGrpSpPr/>
+        <p:nvPr/>
+      </p:nvGrpSpPr>
+      <p:grpSpPr>
+        <a:xfrm>
+          <a:off x="0" y="0"/>
+          <a:ext cx="0" cy="0"/>
+          <a:chOff x="0" y="0"/>
+          <a:chExt cx="0" cy="0"/>
+        </a:xfrm>
+      </p:grpSpPr>
+      <p:sp>
+        <p:nvSpPr>
+          <p:cNvPr id="2" name="Title 1"/>
+          <p:cNvSpPr>
+            <a:spLocks noGrp="1"/>
+          </p:cNvSpPr>
+          <p:nvPr>
+            <p:ph type="title"/>
+          </p:nvPr>
+        </p:nvSpPr>
+        <p:spPr/>
+        <p:txBody>
+          <a:bodyPr/>
+          <a:lstStyle/>
+          <a:p>
+            <a:r>
+              <a:rPr lang="en-GB" dirty="0"/>
               <a:t>References</a:t>
             </a:r>
             <a:endParaRPr lang="en-US" dirty="0"/>
@@ -12547,10 +12629,10 @@
       </p:sp>
       <p:pic>
         <p:nvPicPr>
-          <p:cNvPr id="7" name="Picture 6">
+          <p:cNvPr id="5" name="Picture 4">
             <a:extLst>
               <a:ext uri="{FF2B5EF4-FFF2-40B4-BE49-F238E27FC236}">
-                <a16:creationId xmlns:a16="http://schemas.microsoft.com/office/drawing/2014/main" id="{276704FB-71F7-43B7-9F86-8537A7787B5D}"/>
+                <a16:creationId xmlns:a16="http://schemas.microsoft.com/office/drawing/2014/main" id="{851C73C3-1484-4C1F-AB25-0081BC1E6756}"/>
               </a:ext>
             </a:extLst>
           </p:cNvPr>
@@ -12567,8 +12649,8 @@
         </p:blipFill>
         <p:spPr>
           <a:xfrm>
-            <a:off x="1141412" y="1989170"/>
-            <a:ext cx="8617377" cy="1967010"/>
+            <a:off x="1141413" y="1772234"/>
+            <a:ext cx="10129737" cy="4012746"/>
           </a:xfrm>
           <a:prstGeom prst="rect">
             <a:avLst/>
@@ -12588,7 +12670,7 @@
 </p:sld>
 </file>
 
-<file path=ppt/slides/slide11.xml><?xml version="1.0" encoding="utf-8"?>
+<file path=ppt/slides/slide12.xml><?xml version="1.0" encoding="utf-8"?>
 <p:sld xmlns:a="http://schemas.openxmlformats.org/drawingml/2006/main" xmlns:r="http://schemas.openxmlformats.org/officeDocument/2006/relationships" xmlns:p="http://schemas.openxmlformats.org/presentationml/2006/main">
   <p:cSld>
     <p:spTree>
@@ -12764,7 +12846,7 @@
             </a:pPr>
             <a:r>
               <a:rPr lang="en-GB" dirty="0"/>
-              <a:t>The theories presented are by public speakers with industry experience of which presented their theories in a peered reviewed manor, be that by a presentation article or interview. </a:t>
+              <a:t>The theories presented are by public speakers with industry experience of which presented their theories in a peered reviewed manor, be that by a presentation, article or interview. </a:t>
             </a:r>
           </a:p>
           <a:p>
@@ -12966,8 +13048,8 @@
         </p:blipFill>
         <p:spPr>
           <a:xfrm>
-            <a:off x="8997515" y="187293"/>
-            <a:ext cx="2907217" cy="2066193"/>
+            <a:off x="7192541" y="187293"/>
+            <a:ext cx="4712191" cy="3349009"/>
           </a:xfrm>
           <a:prstGeom prst="rect">
             <a:avLst/>
@@ -13733,7 +13815,7 @@
         <p:spPr/>
         <p:txBody>
           <a:bodyPr>
-            <a:normAutofit fontScale="92500"/>
+            <a:normAutofit/>
           </a:bodyPr>
           <a:lstStyle/>
           <a:p>
@@ -13743,17 +13825,34 @@
             </a:r>
           </a:p>
           <a:p>
+            <a:pPr marL="0" indent="0">
+              <a:buNone/>
+            </a:pPr>
             <a:r>
               <a:rPr lang="en-GB" dirty="0"/>
-              <a:t>The player can get emotionally invested in the games playable character which is a potato as the player may want it to be free and have a fear losing it in a variety of ways such as being eaten and being stabbed by forks. This gives the potato human traits as a want to survive and makes the player believe it is a real thing.</a:t>
-            </a:r>
+              <a:t>-Video </a:t>
+            </a:r>
+            <a:r>
+              <a:rPr lang="en-GB" dirty="0">
+                <a:hlinkClick r:id="rId2"/>
+              </a:rPr>
+              <a:t>https://www.youtube.com/watch?v=YWL1jeL0uBU</a:t>
+            </a:r>
+            <a:endParaRPr lang="en-GB" dirty="0"/>
           </a:p>
           <a:p>
             <a:r>
               <a:rPr lang="en-GB" dirty="0"/>
-              <a:t>The Potato has no visual familiarity to a human or share any visual or auditory feedback, so it is harder to have empathy for that object.</a:t>
-            </a:r>
-            <a:endParaRPr lang="en-US" dirty="0"/>
+              <a:t>In her Book ‘</a:t>
+            </a:r>
+            <a:r>
+              <a:rPr lang="en-GB" i="1" dirty="0"/>
+              <a:t>How Games Move Us’ </a:t>
+            </a:r>
+            <a:r>
+              <a:rPr lang="en-GB" dirty="0"/>
+              <a:t>she goes into detail of this ‘Avatar based Roleplay’ and how it allows the player to project themselves onto the character.  </a:t>
+            </a:r>
           </a:p>
         </p:txBody>
       </p:sp>
@@ -13789,7 +13888,13 @@
       </p:grpSpPr>
       <p:sp>
         <p:nvSpPr>
-          <p:cNvPr id="2" name="Title 1"/>
+          <p:cNvPr id="2" name="Title 1">
+            <a:extLst>
+              <a:ext uri="{FF2B5EF4-FFF2-40B4-BE49-F238E27FC236}">
+                <a16:creationId xmlns:a16="http://schemas.microsoft.com/office/drawing/2014/main" id="{E2E7C5A8-CE47-483C-8532-2D884354A3DA}"/>
+              </a:ext>
+            </a:extLst>
+          </p:cNvPr>
           <p:cNvSpPr>
             <a:spLocks noGrp="1"/>
           </p:cNvSpPr>
@@ -13804,15 +13909,25 @@
           <a:p>
             <a:r>
               <a:rPr lang="en-GB" dirty="0"/>
-              <a:t>Conclusion</a:t>
-            </a:r>
-            <a:endParaRPr lang="en-US" dirty="0"/>
+              <a:t>Katherine </a:t>
+            </a:r>
+            <a:r>
+              <a:rPr lang="en-GB" dirty="0" err="1"/>
+              <a:t>Isbister</a:t>
+            </a:r>
+            <a:endParaRPr lang="en-GB" dirty="0"/>
           </a:p>
         </p:txBody>
       </p:sp>
       <p:sp>
         <p:nvSpPr>
-          <p:cNvPr id="3" name="Content Placeholder 2"/>
+          <p:cNvPr id="3" name="Content Placeholder 2">
+            <a:extLst>
+              <a:ext uri="{FF2B5EF4-FFF2-40B4-BE49-F238E27FC236}">
+                <a16:creationId xmlns:a16="http://schemas.microsoft.com/office/drawing/2014/main" id="{B72F1985-F815-4201-AB07-658999F28E89}"/>
+              </a:ext>
+            </a:extLst>
+          </p:cNvPr>
           <p:cNvSpPr>
             <a:spLocks noGrp="1"/>
           </p:cNvSpPr>
@@ -13822,26 +13937,32 @@
         </p:nvSpPr>
         <p:spPr/>
         <p:txBody>
-          <a:bodyPr/>
+          <a:bodyPr>
+            <a:normAutofit lnSpcReduction="10000"/>
+          </a:bodyPr>
           <a:lstStyle/>
           <a:p>
             <a:r>
-              <a:rPr lang="en-US" dirty="0"/>
-              <a:t>The theories talked about show different aspects of the game and how it reflects to the player from; experience through difficulty, game flow and emotional investment. </a:t>
-            </a:r>
-          </a:p>
-          <a:p>
-            <a:r>
-              <a:rPr lang="en-US" dirty="0"/>
-              <a:t>Though the game does follow these theories it does not dedicate itself to prove these theories, instead it is flexible and allows more theories to be implemented in later if needed.   </a:t>
-            </a:r>
+              <a:rPr lang="en-GB" dirty="0"/>
+              <a:t>The player can get emotionally invested in the games playable character which is a potato as the player may want it to be free and have a fear losing it in a variety of ways such as being eaten and being stabbed by forks. This gives the potato human traits as a want to survive and makes the player believe it is a real living thing.</a:t>
+            </a:r>
+          </a:p>
+          <a:p>
+            <a:r>
+              <a:rPr lang="en-GB" dirty="0"/>
+              <a:t>The Potato has no visual familiarity to a human or share any visual or auditory feedback, so it is harder to have empathy for that object. There is also not customisable avatar for the player.</a:t>
+            </a:r>
+            <a:endParaRPr lang="en-US" dirty="0"/>
+          </a:p>
+          <a:p>
+            <a:endParaRPr lang="en-GB" dirty="0"/>
           </a:p>
         </p:txBody>
       </p:sp>
     </p:spTree>
     <p:extLst>
       <p:ext uri="{BB962C8B-B14F-4D97-AF65-F5344CB8AC3E}">
-        <p14:creationId xmlns:p14="http://schemas.microsoft.com/office/powerpoint/2010/main" val="675517695"/>
+        <p14:creationId xmlns:p14="http://schemas.microsoft.com/office/powerpoint/2010/main" val="400723332"/>
       </p:ext>
     </p:extLst>
   </p:cSld>

</xml_diff>